<commit_message>
update the IMMD and WPT changes
</commit_message>
<xml_diff>
--- a/Reports/WPT/Inductance_matrix_real.pptx
+++ b/Reports/WPT/Inductance_matrix_real.pptx
@@ -217,7 +217,7 @@
           <a:p>
             <a:fld id="{F58AEB54-1782-4262-A2FC-23F14D61222D}" type="datetimeFigureOut">
               <a:rPr lang="en-US" smtClean="0"/>
-              <a:t>5/23/2020</a:t>
+              <a:t>5/25/2020</a:t>
             </a:fld>
             <a:endParaRPr lang="en-US"/>
           </a:p>
@@ -715,7 +715,7 @@
           <a:p>
             <a:fld id="{87B9B787-EA1A-4A69-9A79-076FE1838716}" type="datetimeFigureOut">
               <a:rPr lang="en-US" smtClean="0"/>
-              <a:t>5/23/2020</a:t>
+              <a:t>5/25/2020</a:t>
             </a:fld>
             <a:endParaRPr lang="en-US"/>
           </a:p>
@@ -913,7 +913,7 @@
           <a:p>
             <a:fld id="{87B9B787-EA1A-4A69-9A79-076FE1838716}" type="datetimeFigureOut">
               <a:rPr lang="en-US" smtClean="0"/>
-              <a:t>5/23/2020</a:t>
+              <a:t>5/25/2020</a:t>
             </a:fld>
             <a:endParaRPr lang="en-US"/>
           </a:p>
@@ -1121,7 +1121,7 @@
           <a:p>
             <a:fld id="{87B9B787-EA1A-4A69-9A79-076FE1838716}" type="datetimeFigureOut">
               <a:rPr lang="en-US" smtClean="0"/>
-              <a:t>5/23/2020</a:t>
+              <a:t>5/25/2020</a:t>
             </a:fld>
             <a:endParaRPr lang="en-US"/>
           </a:p>
@@ -1319,7 +1319,7 @@
           <a:p>
             <a:fld id="{87B9B787-EA1A-4A69-9A79-076FE1838716}" type="datetimeFigureOut">
               <a:rPr lang="en-US" smtClean="0"/>
-              <a:t>5/23/2020</a:t>
+              <a:t>5/25/2020</a:t>
             </a:fld>
             <a:endParaRPr lang="en-US"/>
           </a:p>
@@ -1594,7 +1594,7 @@
           <a:p>
             <a:fld id="{87B9B787-EA1A-4A69-9A79-076FE1838716}" type="datetimeFigureOut">
               <a:rPr lang="en-US" smtClean="0"/>
-              <a:t>5/23/2020</a:t>
+              <a:t>5/25/2020</a:t>
             </a:fld>
             <a:endParaRPr lang="en-US"/>
           </a:p>
@@ -1859,7 +1859,7 @@
           <a:p>
             <a:fld id="{87B9B787-EA1A-4A69-9A79-076FE1838716}" type="datetimeFigureOut">
               <a:rPr lang="en-US" smtClean="0"/>
-              <a:t>5/23/2020</a:t>
+              <a:t>5/25/2020</a:t>
             </a:fld>
             <a:endParaRPr lang="en-US"/>
           </a:p>
@@ -2271,7 +2271,7 @@
           <a:p>
             <a:fld id="{87B9B787-EA1A-4A69-9A79-076FE1838716}" type="datetimeFigureOut">
               <a:rPr lang="en-US" smtClean="0"/>
-              <a:t>5/23/2020</a:t>
+              <a:t>5/25/2020</a:t>
             </a:fld>
             <a:endParaRPr lang="en-US"/>
           </a:p>
@@ -2412,7 +2412,7 @@
           <a:p>
             <a:fld id="{87B9B787-EA1A-4A69-9A79-076FE1838716}" type="datetimeFigureOut">
               <a:rPr lang="en-US" smtClean="0"/>
-              <a:t>5/23/2020</a:t>
+              <a:t>5/25/2020</a:t>
             </a:fld>
             <a:endParaRPr lang="en-US"/>
           </a:p>
@@ -2525,7 +2525,7 @@
           <a:p>
             <a:fld id="{87B9B787-EA1A-4A69-9A79-076FE1838716}" type="datetimeFigureOut">
               <a:rPr lang="en-US" smtClean="0"/>
-              <a:t>5/23/2020</a:t>
+              <a:t>5/25/2020</a:t>
             </a:fld>
             <a:endParaRPr lang="en-US"/>
           </a:p>
@@ -2836,7 +2836,7 @@
           <a:p>
             <a:fld id="{87B9B787-EA1A-4A69-9A79-076FE1838716}" type="datetimeFigureOut">
               <a:rPr lang="en-US" smtClean="0"/>
-              <a:t>5/23/2020</a:t>
+              <a:t>5/25/2020</a:t>
             </a:fld>
             <a:endParaRPr lang="en-US"/>
           </a:p>
@@ -3124,7 +3124,7 @@
           <a:p>
             <a:fld id="{87B9B787-EA1A-4A69-9A79-076FE1838716}" type="datetimeFigureOut">
               <a:rPr lang="en-US" smtClean="0"/>
-              <a:t>5/23/2020</a:t>
+              <a:t>5/25/2020</a:t>
             </a:fld>
             <a:endParaRPr lang="en-US"/>
           </a:p>
@@ -3365,7 +3365,7 @@
           <a:p>
             <a:fld id="{87B9B787-EA1A-4A69-9A79-076FE1838716}" type="datetimeFigureOut">
               <a:rPr lang="en-US" smtClean="0"/>
-              <a:t>5/23/2020</a:t>
+              <a:t>5/25/2020</a:t>
             </a:fld>
             <a:endParaRPr lang="en-US"/>
           </a:p>

</xml_diff>